<commit_message>
Updated UI and added pictures
</commit_message>
<xml_diff>
--- a/Multithreading_With AI/Documents/Final Delivery.pptx
+++ b/Multithreading_With AI/Documents/Final Delivery.pptx
@@ -5,7 +5,7 @@
     <p:sldMasterId id="2147483659" r:id="rId1"/>
   </p:sldMasterIdLst>
   <p:notesMasterIdLst>
-    <p:notesMasterId r:id="rId15"/>
+    <p:notesMasterId r:id="rId18"/>
   </p:notesMasterIdLst>
   <p:sldIdLst>
     <p:sldId id="256" r:id="rId2"/>
@@ -17,10 +17,13 @@
     <p:sldId id="260" r:id="rId8"/>
     <p:sldId id="261" r:id="rId9"/>
     <p:sldId id="281" r:id="rId10"/>
-    <p:sldId id="280" r:id="rId11"/>
-    <p:sldId id="262" r:id="rId12"/>
-    <p:sldId id="263" r:id="rId13"/>
-    <p:sldId id="277" r:id="rId14"/>
+    <p:sldId id="283" r:id="rId11"/>
+    <p:sldId id="280" r:id="rId12"/>
+    <p:sldId id="262" r:id="rId13"/>
+    <p:sldId id="282" r:id="rId14"/>
+    <p:sldId id="263" r:id="rId15"/>
+    <p:sldId id="284" r:id="rId16"/>
+    <p:sldId id="277" r:id="rId17"/>
   </p:sldIdLst>
   <p:sldSz cx="9144000" cy="5143500" type="screen16x9"/>
   <p:notesSz cx="6858000" cy="9144000"/>
@@ -255,7 +258,7 @@
   </p:defaultTextStyle>
   <p:extLst>
     <p:ext uri="{EFAFB233-063F-42B5-8137-9DF3F51BA10A}">
-      <p15:sldGuideLst xmlns:p15="http://schemas.microsoft.com/office/powerpoint/2012/main" xmlns="">
+      <p15:sldGuideLst xmlns="" xmlns:p15="http://schemas.microsoft.com/office/powerpoint/2012/main">
         <p15:guide id="1" orient="horz" pos="1620">
           <p15:clr>
             <a:srgbClr val="A4A3A4"/>
@@ -912,11 +915,7 @@
               </a:spcAft>
               <a:buNone/>
             </a:pPr>
-            <a:r>
-              <a:rPr lang="en-US" dirty="0" smtClean="0"/>
-              <a:t>Depth-first search (DFS) is an algorithm for traversing or searching tree or graph data structures. The algorithm starts at the root node (selecting some arbitrary node as the root node in the case of a graph) and explores as far as possible along each branch before backtracking.</a:t>
-            </a:r>
-            <a:endParaRPr dirty="0"/>
+            <a:endParaRPr/>
           </a:p>
         </p:txBody>
       </p:sp>
@@ -929,6 +928,114 @@
 </file>
 
 <file path=ppt/notesSlides/notesSlide11.xml><?xml version="1.0" encoding="utf-8"?>
+<p:notes xmlns:a="http://schemas.openxmlformats.org/drawingml/2006/main" xmlns:r="http://schemas.openxmlformats.org/officeDocument/2006/relationships" xmlns:p="http://schemas.openxmlformats.org/presentationml/2006/main" showMasterSp="0" showMasterPhAnim="0">
+  <p:cSld>
+    <p:spTree>
+      <p:nvGrpSpPr>
+        <p:cNvPr id="1" name="Shape 98"/>
+        <p:cNvGrpSpPr/>
+        <p:nvPr/>
+      </p:nvGrpSpPr>
+      <p:grpSpPr>
+        <a:xfrm>
+          <a:off x="0" y="0"/>
+          <a:ext cx="0" cy="0"/>
+          <a:chOff x="0" y="0"/>
+          <a:chExt cx="0" cy="0"/>
+        </a:xfrm>
+      </p:grpSpPr>
+      <p:sp>
+        <p:nvSpPr>
+          <p:cNvPr id="99" name="Google Shape;99;g43801ec828_0_31:notes"/>
+          <p:cNvSpPr>
+            <a:spLocks noGrp="1" noRot="1" noChangeAspect="1"/>
+          </p:cNvSpPr>
+          <p:nvPr>
+            <p:ph type="sldImg" idx="2"/>
+          </p:nvPr>
+        </p:nvSpPr>
+        <p:spPr>
+          <a:xfrm>
+            <a:off x="381000" y="685800"/>
+            <a:ext cx="6096000" cy="3429000"/>
+          </a:xfrm>
+          <a:custGeom>
+            <a:avLst/>
+            <a:gdLst/>
+            <a:ahLst/>
+            <a:cxnLst/>
+            <a:rect l="l" t="t" r="r" b="b"/>
+            <a:pathLst>
+              <a:path w="120000" h="120000" extrusionOk="0">
+                <a:moveTo>
+                  <a:pt x="0" y="0"/>
+                </a:moveTo>
+                <a:lnTo>
+                  <a:pt x="120000" y="0"/>
+                </a:lnTo>
+                <a:lnTo>
+                  <a:pt x="120000" y="120000"/>
+                </a:lnTo>
+                <a:lnTo>
+                  <a:pt x="0" y="120000"/>
+                </a:lnTo>
+                <a:close/>
+              </a:path>
+            </a:pathLst>
+          </a:custGeom>
+        </p:spPr>
+      </p:sp>
+      <p:sp>
+        <p:nvSpPr>
+          <p:cNvPr id="100" name="Google Shape;100;g43801ec828_0_31:notes"/>
+          <p:cNvSpPr txBox="1">
+            <a:spLocks noGrp="1"/>
+          </p:cNvSpPr>
+          <p:nvPr>
+            <p:ph type="body" idx="1"/>
+          </p:nvPr>
+        </p:nvSpPr>
+        <p:spPr>
+          <a:xfrm>
+            <a:off x="685800" y="4343400"/>
+            <a:ext cx="5486400" cy="4114800"/>
+          </a:xfrm>
+          <a:prstGeom prst="rect">
+            <a:avLst/>
+          </a:prstGeom>
+        </p:spPr>
+        <p:txBody>
+          <a:bodyPr spcFirstLastPara="1" wrap="square" lIns="91425" tIns="91425" rIns="91425" bIns="91425" anchor="t" anchorCtr="0">
+            <a:noAutofit/>
+          </a:bodyPr>
+          <a:lstStyle/>
+          <a:p>
+            <a:pPr marL="0" lvl="0" indent="0" algn="l" rtl="0">
+              <a:spcBef>
+                <a:spcPts val="0"/>
+              </a:spcBef>
+              <a:spcAft>
+                <a:spcPts val="0"/>
+              </a:spcAft>
+              <a:buNone/>
+            </a:pPr>
+            <a:r>
+              <a:rPr lang="en-US" dirty="0" smtClean="0"/>
+              <a:t>Depth-first search (DFS) is an algorithm for traversing or searching tree or graph data structures. The algorithm starts at the root node (selecting some arbitrary node as the root node in the case of a graph) and explores as far as possible along each branch before backtracking.</a:t>
+            </a:r>
+            <a:endParaRPr dirty="0"/>
+          </a:p>
+        </p:txBody>
+      </p:sp>
+    </p:spTree>
+  </p:cSld>
+  <p:clrMapOvr>
+    <a:masterClrMapping/>
+  </p:clrMapOvr>
+</p:notes>
+</file>
+
+<file path=ppt/notesSlides/notesSlide12.xml><?xml version="1.0" encoding="utf-8"?>
 <p:notes xmlns:a="http://schemas.openxmlformats.org/drawingml/2006/main" xmlns:r="http://schemas.openxmlformats.org/officeDocument/2006/relationships" xmlns:p="http://schemas.openxmlformats.org/presentationml/2006/main" showMasterSp="0" showMasterPhAnim="0">
   <p:cSld>
     <p:spTree>
@@ -1032,7 +1139,7 @@
 </p:notes>
 </file>
 
-<file path=ppt/notesSlides/notesSlide12.xml><?xml version="1.0" encoding="utf-8"?>
+<file path=ppt/notesSlides/notesSlide13.xml><?xml version="1.0" encoding="utf-8"?>
 <p:notes xmlns:a="http://schemas.openxmlformats.org/drawingml/2006/main" xmlns:r="http://schemas.openxmlformats.org/officeDocument/2006/relationships" xmlns:p="http://schemas.openxmlformats.org/presentationml/2006/main" showMasterSp="0" showMasterPhAnim="0">
   <p:cSld>
     <p:spTree>
@@ -1136,7 +1243,215 @@
 </p:notes>
 </file>
 
-<file path=ppt/notesSlides/notesSlide13.xml><?xml version="1.0" encoding="utf-8"?>
+<file path=ppt/notesSlides/notesSlide14.xml><?xml version="1.0" encoding="utf-8"?>
+<p:notes xmlns:a="http://schemas.openxmlformats.org/drawingml/2006/main" xmlns:r="http://schemas.openxmlformats.org/officeDocument/2006/relationships" xmlns:p="http://schemas.openxmlformats.org/presentationml/2006/main" showMasterSp="0" showMasterPhAnim="0">
+  <p:cSld>
+    <p:spTree>
+      <p:nvGrpSpPr>
+        <p:cNvPr id="1" name="Shape 124"/>
+        <p:cNvGrpSpPr/>
+        <p:nvPr/>
+      </p:nvGrpSpPr>
+      <p:grpSpPr>
+        <a:xfrm>
+          <a:off x="0" y="0"/>
+          <a:ext cx="0" cy="0"/>
+          <a:chOff x="0" y="0"/>
+          <a:chExt cx="0" cy="0"/>
+        </a:xfrm>
+      </p:grpSpPr>
+      <p:sp>
+        <p:nvSpPr>
+          <p:cNvPr id="125" name="Google Shape;125;g43801ec828_0_59:notes"/>
+          <p:cNvSpPr>
+            <a:spLocks noGrp="1" noRot="1" noChangeAspect="1"/>
+          </p:cNvSpPr>
+          <p:nvPr>
+            <p:ph type="sldImg" idx="2"/>
+          </p:nvPr>
+        </p:nvSpPr>
+        <p:spPr>
+          <a:xfrm>
+            <a:off x="381000" y="685800"/>
+            <a:ext cx="6096000" cy="3429000"/>
+          </a:xfrm>
+          <a:custGeom>
+            <a:avLst/>
+            <a:gdLst/>
+            <a:ahLst/>
+            <a:cxnLst/>
+            <a:rect l="l" t="t" r="r" b="b"/>
+            <a:pathLst>
+              <a:path w="120000" h="120000" extrusionOk="0">
+                <a:moveTo>
+                  <a:pt x="0" y="0"/>
+                </a:moveTo>
+                <a:lnTo>
+                  <a:pt x="120000" y="0"/>
+                </a:lnTo>
+                <a:lnTo>
+                  <a:pt x="120000" y="120000"/>
+                </a:lnTo>
+                <a:lnTo>
+                  <a:pt x="0" y="120000"/>
+                </a:lnTo>
+                <a:close/>
+              </a:path>
+            </a:pathLst>
+          </a:custGeom>
+        </p:spPr>
+      </p:sp>
+      <p:sp>
+        <p:nvSpPr>
+          <p:cNvPr id="126" name="Google Shape;126;g43801ec828_0_59:notes"/>
+          <p:cNvSpPr txBox="1">
+            <a:spLocks noGrp="1"/>
+          </p:cNvSpPr>
+          <p:nvPr>
+            <p:ph type="body" idx="1"/>
+          </p:nvPr>
+        </p:nvSpPr>
+        <p:spPr>
+          <a:xfrm>
+            <a:off x="685800" y="4343400"/>
+            <a:ext cx="5486400" cy="4114800"/>
+          </a:xfrm>
+          <a:prstGeom prst="rect">
+            <a:avLst/>
+          </a:prstGeom>
+        </p:spPr>
+        <p:txBody>
+          <a:bodyPr spcFirstLastPara="1" wrap="square" lIns="91425" tIns="91425" rIns="91425" bIns="91425" anchor="t" anchorCtr="0">
+            <a:noAutofit/>
+          </a:bodyPr>
+          <a:lstStyle/>
+          <a:p>
+            <a:pPr marL="0" lvl="0" indent="0" algn="l" rtl="0">
+              <a:spcBef>
+                <a:spcPts val="0"/>
+              </a:spcBef>
+              <a:spcAft>
+                <a:spcPts val="0"/>
+              </a:spcAft>
+              <a:buNone/>
+            </a:pPr>
+            <a:endParaRPr/>
+          </a:p>
+        </p:txBody>
+      </p:sp>
+    </p:spTree>
+  </p:cSld>
+  <p:clrMapOvr>
+    <a:masterClrMapping/>
+  </p:clrMapOvr>
+</p:notes>
+</file>
+
+<file path=ppt/notesSlides/notesSlide15.xml><?xml version="1.0" encoding="utf-8"?>
+<p:notes xmlns:a="http://schemas.openxmlformats.org/drawingml/2006/main" xmlns:r="http://schemas.openxmlformats.org/officeDocument/2006/relationships" xmlns:p="http://schemas.openxmlformats.org/presentationml/2006/main" showMasterSp="0" showMasterPhAnim="0">
+  <p:cSld>
+    <p:spTree>
+      <p:nvGrpSpPr>
+        <p:cNvPr id="1" name="Shape 124"/>
+        <p:cNvGrpSpPr/>
+        <p:nvPr/>
+      </p:nvGrpSpPr>
+      <p:grpSpPr>
+        <a:xfrm>
+          <a:off x="0" y="0"/>
+          <a:ext cx="0" cy="0"/>
+          <a:chOff x="0" y="0"/>
+          <a:chExt cx="0" cy="0"/>
+        </a:xfrm>
+      </p:grpSpPr>
+      <p:sp>
+        <p:nvSpPr>
+          <p:cNvPr id="125" name="Google Shape;125;g43801ec828_0_59:notes"/>
+          <p:cNvSpPr>
+            <a:spLocks noGrp="1" noRot="1" noChangeAspect="1"/>
+          </p:cNvSpPr>
+          <p:nvPr>
+            <p:ph type="sldImg" idx="2"/>
+          </p:nvPr>
+        </p:nvSpPr>
+        <p:spPr>
+          <a:xfrm>
+            <a:off x="381000" y="685800"/>
+            <a:ext cx="6096000" cy="3429000"/>
+          </a:xfrm>
+          <a:custGeom>
+            <a:avLst/>
+            <a:gdLst/>
+            <a:ahLst/>
+            <a:cxnLst/>
+            <a:rect l="l" t="t" r="r" b="b"/>
+            <a:pathLst>
+              <a:path w="120000" h="120000" extrusionOk="0">
+                <a:moveTo>
+                  <a:pt x="0" y="0"/>
+                </a:moveTo>
+                <a:lnTo>
+                  <a:pt x="120000" y="0"/>
+                </a:lnTo>
+                <a:lnTo>
+                  <a:pt x="120000" y="120000"/>
+                </a:lnTo>
+                <a:lnTo>
+                  <a:pt x="0" y="120000"/>
+                </a:lnTo>
+                <a:close/>
+              </a:path>
+            </a:pathLst>
+          </a:custGeom>
+        </p:spPr>
+      </p:sp>
+      <p:sp>
+        <p:nvSpPr>
+          <p:cNvPr id="126" name="Google Shape;126;g43801ec828_0_59:notes"/>
+          <p:cNvSpPr txBox="1">
+            <a:spLocks noGrp="1"/>
+          </p:cNvSpPr>
+          <p:nvPr>
+            <p:ph type="body" idx="1"/>
+          </p:nvPr>
+        </p:nvSpPr>
+        <p:spPr>
+          <a:xfrm>
+            <a:off x="685800" y="4343400"/>
+            <a:ext cx="5486400" cy="4114800"/>
+          </a:xfrm>
+          <a:prstGeom prst="rect">
+            <a:avLst/>
+          </a:prstGeom>
+        </p:spPr>
+        <p:txBody>
+          <a:bodyPr spcFirstLastPara="1" wrap="square" lIns="91425" tIns="91425" rIns="91425" bIns="91425" anchor="t" anchorCtr="0">
+            <a:noAutofit/>
+          </a:bodyPr>
+          <a:lstStyle/>
+          <a:p>
+            <a:pPr marL="0" lvl="0" indent="0" algn="l" rtl="0">
+              <a:spcBef>
+                <a:spcPts val="0"/>
+              </a:spcBef>
+              <a:spcAft>
+                <a:spcPts val="0"/>
+              </a:spcAft>
+              <a:buNone/>
+            </a:pPr>
+            <a:endParaRPr/>
+          </a:p>
+        </p:txBody>
+      </p:sp>
+    </p:spTree>
+  </p:cSld>
+  <p:clrMapOvr>
+    <a:masterClrMapping/>
+  </p:clrMapOvr>
+</p:notes>
+</file>
+
+<file path=ppt/notesSlides/notesSlide16.xml><?xml version="1.0" encoding="utf-8"?>
 <p:notes xmlns:a="http://schemas.openxmlformats.org/drawingml/2006/main" xmlns:r="http://schemas.openxmlformats.org/officeDocument/2006/relationships" xmlns:p="http://schemas.openxmlformats.org/presentationml/2006/main" showMasterSp="0" showMasterPhAnim="0">
   <p:cSld>
     <p:spTree>
@@ -1862,7 +2177,108 @@
               </a:spcAft>
               <a:buNone/>
             </a:pPr>
-            <a:endParaRPr/>
+            <a:r>
+              <a:rPr lang="en-US" dirty="0" smtClean="0"/>
+              <a:t>Volatile- </a:t>
+            </a:r>
+            <a:r>
+              <a:rPr lang="en-US" sz="1100" b="0" i="0" u="none" strike="noStrike" cap="none" dirty="0" smtClean="0">
+                <a:solidFill>
+                  <a:srgbClr val="000000"/>
+                </a:solidFill>
+                <a:effectLst/>
+                <a:latin typeface="Arial"/>
+                <a:ea typeface="Arial"/>
+                <a:cs typeface="Arial"/>
+                <a:sym typeface="Arial"/>
+              </a:rPr>
+              <a:t>indicates that a field might be modified by multiple threads that are executing at the same time.</a:t>
+            </a:r>
+          </a:p>
+          <a:p>
+            <a:pPr marL="0" lvl="0" indent="0" algn="l" rtl="0">
+              <a:spcBef>
+                <a:spcPts val="0"/>
+              </a:spcBef>
+              <a:spcAft>
+                <a:spcPts val="0"/>
+              </a:spcAft>
+              <a:buNone/>
+            </a:pPr>
+            <a:r>
+              <a:rPr lang="en-US" sz="1100" b="0" i="0" u="none" strike="noStrike" cap="none" dirty="0" smtClean="0">
+                <a:solidFill>
+                  <a:srgbClr val="000000"/>
+                </a:solidFill>
+                <a:effectLst/>
+                <a:latin typeface="Arial"/>
+                <a:cs typeface="Arial"/>
+                <a:sym typeface="Arial"/>
+              </a:rPr>
+              <a:t>Lock - </a:t>
+            </a:r>
+            <a:r>
+              <a:rPr lang="en-US" sz="1100" b="0" i="0" u="none" strike="noStrike" cap="none" dirty="0" smtClean="0">
+                <a:solidFill>
+                  <a:srgbClr val="000000"/>
+                </a:solidFill>
+                <a:effectLst/>
+                <a:latin typeface="Arial"/>
+                <a:ea typeface="Arial"/>
+                <a:cs typeface="Arial"/>
+                <a:sym typeface="Arial"/>
+              </a:rPr>
+              <a:t>ensures that one thread is executing a piece of code at one time. The lock keyword ensures that one thread does not enter a critical section of code while another thread is in that critical section.</a:t>
+            </a:r>
+          </a:p>
+          <a:p>
+            <a:pPr marL="0" lvl="0" indent="0" algn="l" rtl="0">
+              <a:spcBef>
+                <a:spcPts val="0"/>
+              </a:spcBef>
+              <a:spcAft>
+                <a:spcPts val="0"/>
+              </a:spcAft>
+              <a:buNone/>
+            </a:pPr>
+            <a:r>
+              <a:rPr lang="en-US" sz="1100" b="0" i="0" u="none" strike="noStrike" cap="none" dirty="0" smtClean="0">
+                <a:solidFill>
+                  <a:srgbClr val="000000"/>
+                </a:solidFill>
+                <a:effectLst/>
+                <a:latin typeface="Arial"/>
+                <a:cs typeface="Arial"/>
+                <a:sym typeface="Arial"/>
+              </a:rPr>
+              <a:t>Monitor</a:t>
+            </a:r>
+            <a:r>
+              <a:rPr lang="en-US" sz="1100" b="0" i="0" u="none" strike="noStrike" cap="none" baseline="0" dirty="0" smtClean="0">
+                <a:solidFill>
+                  <a:srgbClr val="000000"/>
+                </a:solidFill>
+                <a:effectLst/>
+                <a:latin typeface="Arial"/>
+                <a:cs typeface="Arial"/>
+                <a:sym typeface="Arial"/>
+              </a:rPr>
+              <a:t> - </a:t>
+            </a:r>
+            <a:r>
+              <a:rPr lang="en-US" sz="1100" b="0" i="0" u="none" strike="noStrike" cap="none" dirty="0" smtClean="0">
+                <a:solidFill>
+                  <a:srgbClr val="000000"/>
+                </a:solidFill>
+                <a:effectLst/>
+                <a:latin typeface="Arial"/>
+                <a:ea typeface="Arial"/>
+                <a:cs typeface="Arial"/>
+                <a:sym typeface="Arial"/>
+              </a:rPr>
+              <a:t>Monitor is no different from lock but the monitor class provides more control over the synchronization of various threads trying to access the same lock of code.</a:t>
+            </a:r>
+            <a:endParaRPr dirty="0"/>
           </a:p>
         </p:txBody>
       </p:sp>
@@ -7094,6 +7510,227 @@
     <p:bg>
       <p:bgPr>
         <a:solidFill>
+          <a:schemeClr val="bg1"/>
+        </a:solidFill>
+        <a:effectLst/>
+      </p:bgPr>
+    </p:bg>
+    <p:spTree>
+      <p:nvGrpSpPr>
+        <p:cNvPr id="1" name="Shape 101"/>
+        <p:cNvGrpSpPr/>
+        <p:nvPr/>
+      </p:nvGrpSpPr>
+      <p:grpSpPr>
+        <a:xfrm>
+          <a:off x="0" y="0"/>
+          <a:ext cx="0" cy="0"/>
+          <a:chOff x="0" y="0"/>
+          <a:chExt cx="0" cy="0"/>
+        </a:xfrm>
+      </p:grpSpPr>
+      <p:pic>
+        <p:nvPicPr>
+          <p:cNvPr id="103" name="Google Shape;103;p18"/>
+          <p:cNvPicPr preferRelativeResize="0"/>
+          <p:nvPr/>
+        </p:nvPicPr>
+        <p:blipFill>
+          <a:blip r:embed="rId3">
+            <a:alphaModFix/>
+          </a:blip>
+          <a:stretch>
+            <a:fillRect/>
+          </a:stretch>
+        </p:blipFill>
+        <p:spPr>
+          <a:xfrm>
+            <a:off x="56017" y="46250"/>
+            <a:ext cx="2796750" cy="799075"/>
+          </a:xfrm>
+          <a:prstGeom prst="rect">
+            <a:avLst/>
+          </a:prstGeom>
+          <a:noFill/>
+          <a:ln>
+            <a:noFill/>
+          </a:ln>
+        </p:spPr>
+      </p:pic>
+      <p:pic>
+        <p:nvPicPr>
+          <p:cNvPr id="104" name="Google Shape;104;p18"/>
+          <p:cNvPicPr preferRelativeResize="0"/>
+          <p:nvPr/>
+        </p:nvPicPr>
+        <p:blipFill>
+          <a:blip r:embed="rId4">
+            <a:alphaModFix/>
+          </a:blip>
+          <a:stretch>
+            <a:fillRect/>
+          </a:stretch>
+        </p:blipFill>
+        <p:spPr>
+          <a:xfrm>
+            <a:off x="-7164" y="20196"/>
+            <a:ext cx="3166375" cy="845625"/>
+          </a:xfrm>
+          <a:prstGeom prst="rect">
+            <a:avLst/>
+          </a:prstGeom>
+          <a:noFill/>
+          <a:ln>
+            <a:noFill/>
+          </a:ln>
+        </p:spPr>
+      </p:pic>
+      <p:sp>
+        <p:nvSpPr>
+          <p:cNvPr id="105" name="Google Shape;105;p18"/>
+          <p:cNvSpPr/>
+          <p:nvPr/>
+        </p:nvSpPr>
+        <p:spPr>
+          <a:xfrm>
+            <a:off x="974250" y="53425"/>
+            <a:ext cx="7858200" cy="792000"/>
+          </a:xfrm>
+          <a:prstGeom prst="rect">
+            <a:avLst/>
+          </a:prstGeom>
+          <a:solidFill>
+            <a:srgbClr val="F3F3F3"/>
+          </a:solidFill>
+          <a:ln>
+            <a:noFill/>
+          </a:ln>
+        </p:spPr>
+        <p:txBody>
+          <a:bodyPr spcFirstLastPara="1" wrap="square" lIns="91425" tIns="91425" rIns="91425" bIns="91425" anchor="ctr" anchorCtr="0">
+            <a:noAutofit/>
+          </a:bodyPr>
+          <a:lstStyle/>
+          <a:p>
+            <a:pPr marL="0" lvl="0" indent="0" algn="l" rtl="0">
+              <a:spcBef>
+                <a:spcPts val="0"/>
+              </a:spcBef>
+              <a:spcAft>
+                <a:spcPts val="0"/>
+              </a:spcAft>
+              <a:buNone/>
+            </a:pPr>
+            <a:endParaRPr/>
+          </a:p>
+        </p:txBody>
+      </p:sp>
+      <p:sp>
+        <p:nvSpPr>
+          <p:cNvPr id="106" name="Google Shape;106;p18"/>
+          <p:cNvSpPr txBox="1">
+            <a:spLocks noGrp="1"/>
+          </p:cNvSpPr>
+          <p:nvPr>
+            <p:ph type="title"/>
+          </p:nvPr>
+        </p:nvSpPr>
+        <p:spPr>
+          <a:xfrm>
+            <a:off x="1049550" y="163075"/>
+            <a:ext cx="7599900" cy="572700"/>
+          </a:xfrm>
+          <a:prstGeom prst="rect">
+            <a:avLst/>
+          </a:prstGeom>
+        </p:spPr>
+        <p:txBody>
+          <a:bodyPr spcFirstLastPara="1" wrap="square" lIns="91425" tIns="91425" rIns="91425" bIns="91425" anchor="t" anchorCtr="0">
+            <a:noAutofit/>
+          </a:bodyPr>
+          <a:lstStyle/>
+          <a:p>
+            <a:pPr marL="0" lvl="0" indent="0" algn="l" rtl="0">
+              <a:spcBef>
+                <a:spcPts val="0"/>
+              </a:spcBef>
+              <a:spcAft>
+                <a:spcPts val="0"/>
+              </a:spcAft>
+              <a:buNone/>
+            </a:pPr>
+            <a:r>
+              <a:rPr lang="en-GB" dirty="0">
+                <a:solidFill>
+                  <a:srgbClr val="005A7C"/>
+                </a:solidFill>
+              </a:rPr>
+              <a:t>PROJECT FEATURES</a:t>
+            </a:r>
+            <a:endParaRPr dirty="0">
+              <a:solidFill>
+                <a:srgbClr val="005A7C"/>
+              </a:solidFill>
+            </a:endParaRPr>
+          </a:p>
+        </p:txBody>
+      </p:sp>
+      <p:pic>
+        <p:nvPicPr>
+          <p:cNvPr id="3" name="그림 2"/>
+          <p:cNvPicPr>
+            <a:picLocks noChangeAspect="1"/>
+          </p:cNvPicPr>
+          <p:nvPr/>
+        </p:nvPicPr>
+        <p:blipFill>
+          <a:blip r:embed="rId5">
+            <a:extLst>
+              <a:ext uri="{28A0092B-C50C-407E-A947-70E740481C1C}">
+                <a14:useLocalDpi xmlns:a14="http://schemas.microsoft.com/office/drawing/2010/main" val="0"/>
+              </a:ext>
+            </a:extLst>
+          </a:blip>
+          <a:stretch>
+            <a:fillRect/>
+          </a:stretch>
+        </p:blipFill>
+        <p:spPr>
+          <a:xfrm>
+            <a:off x="2466804" y="833718"/>
+            <a:ext cx="4004817" cy="4309782"/>
+          </a:xfrm>
+          <a:prstGeom prst="rect">
+            <a:avLst/>
+          </a:prstGeom>
+        </p:spPr>
+      </p:pic>
+    </p:spTree>
+    <p:extLst>
+      <p:ext uri="{BB962C8B-B14F-4D97-AF65-F5344CB8AC3E}">
+        <p14:creationId xmlns:p14="http://schemas.microsoft.com/office/powerpoint/2010/main" val="3987359543"/>
+      </p:ext>
+    </p:extLst>
+  </p:cSld>
+  <p:clrMapOvr>
+    <a:masterClrMapping/>
+  </p:clrMapOvr>
+  <p:timing>
+    <p:tnLst>
+      <p:par>
+        <p:cTn id="1" dur="indefinite" restart="never" nodeType="tmRoot"/>
+      </p:par>
+    </p:tnLst>
+  </p:timing>
+</p:sld>
+</file>
+
+<file path=ppt/slides/slide11.xml><?xml version="1.0" encoding="utf-8"?>
+<p:sld xmlns:a="http://schemas.openxmlformats.org/drawingml/2006/main" xmlns:r="http://schemas.openxmlformats.org/officeDocument/2006/relationships" xmlns:p="http://schemas.openxmlformats.org/presentationml/2006/main">
+  <p:cSld>
+    <p:bg>
+      <p:bgPr>
+        <a:solidFill>
           <a:srgbClr val="FFFFFF"/>
         </a:solidFill>
         <a:effectLst/>
@@ -7609,7 +8246,7 @@
 </p:sld>
 </file>
 
-<file path=ppt/slides/slide11.xml><?xml version="1.0" encoding="utf-8"?>
+<file path=ppt/slides/slide12.xml><?xml version="1.0" encoding="utf-8"?>
 <p:sld xmlns:a="http://schemas.openxmlformats.org/drawingml/2006/main" xmlns:r="http://schemas.openxmlformats.org/officeDocument/2006/relationships" xmlns:p="http://schemas.openxmlformats.org/presentationml/2006/main">
   <p:cSld>
     <p:bg>
@@ -7908,7 +8545,238 @@
 </p:sld>
 </file>
 
-<file path=ppt/slides/slide12.xml><?xml version="1.0" encoding="utf-8"?>
+<file path=ppt/slides/slide13.xml><?xml version="1.0" encoding="utf-8"?>
+<p:sld xmlns:a="http://schemas.openxmlformats.org/drawingml/2006/main" xmlns:r="http://schemas.openxmlformats.org/officeDocument/2006/relationships" xmlns:p="http://schemas.openxmlformats.org/presentationml/2006/main">
+  <p:cSld>
+    <p:bg>
+      <p:bgPr>
+        <a:solidFill>
+          <a:schemeClr val="bg1"/>
+        </a:solidFill>
+        <a:effectLst/>
+      </p:bgPr>
+    </p:bg>
+    <p:spTree>
+      <p:nvGrpSpPr>
+        <p:cNvPr id="1" name="Shape 127"/>
+        <p:cNvGrpSpPr/>
+        <p:nvPr/>
+      </p:nvGrpSpPr>
+      <p:grpSpPr>
+        <a:xfrm>
+          <a:off x="0" y="0"/>
+          <a:ext cx="0" cy="0"/>
+          <a:chOff x="0" y="0"/>
+          <a:chExt cx="0" cy="0"/>
+        </a:xfrm>
+      </p:grpSpPr>
+      <p:pic>
+        <p:nvPicPr>
+          <p:cNvPr id="129" name="Google Shape;129;p20"/>
+          <p:cNvPicPr preferRelativeResize="0"/>
+          <p:nvPr/>
+        </p:nvPicPr>
+        <p:blipFill>
+          <a:blip r:embed="rId3">
+            <a:alphaModFix/>
+          </a:blip>
+          <a:stretch>
+            <a:fillRect/>
+          </a:stretch>
+        </p:blipFill>
+        <p:spPr>
+          <a:xfrm>
+            <a:off x="56017" y="46250"/>
+            <a:ext cx="2796750" cy="799075"/>
+          </a:xfrm>
+          <a:prstGeom prst="rect">
+            <a:avLst/>
+          </a:prstGeom>
+          <a:noFill/>
+          <a:ln>
+            <a:noFill/>
+          </a:ln>
+        </p:spPr>
+      </p:pic>
+      <p:pic>
+        <p:nvPicPr>
+          <p:cNvPr id="130" name="Google Shape;130;p20"/>
+          <p:cNvPicPr preferRelativeResize="0"/>
+          <p:nvPr/>
+        </p:nvPicPr>
+        <p:blipFill>
+          <a:blip r:embed="rId4">
+            <a:alphaModFix/>
+          </a:blip>
+          <a:stretch>
+            <a:fillRect/>
+          </a:stretch>
+        </p:blipFill>
+        <p:spPr>
+          <a:xfrm>
+            <a:off x="-7164" y="20196"/>
+            <a:ext cx="3166375" cy="845625"/>
+          </a:xfrm>
+          <a:prstGeom prst="rect">
+            <a:avLst/>
+          </a:prstGeom>
+          <a:noFill/>
+          <a:ln>
+            <a:noFill/>
+          </a:ln>
+        </p:spPr>
+      </p:pic>
+      <p:sp>
+        <p:nvSpPr>
+          <p:cNvPr id="131" name="Google Shape;131;p20"/>
+          <p:cNvSpPr/>
+          <p:nvPr/>
+        </p:nvSpPr>
+        <p:spPr>
+          <a:xfrm>
+            <a:off x="974250" y="53425"/>
+            <a:ext cx="7858200" cy="792000"/>
+          </a:xfrm>
+          <a:prstGeom prst="rect">
+            <a:avLst/>
+          </a:prstGeom>
+          <a:solidFill>
+            <a:srgbClr val="F3F3F3"/>
+          </a:solidFill>
+          <a:ln>
+            <a:noFill/>
+          </a:ln>
+        </p:spPr>
+        <p:txBody>
+          <a:bodyPr spcFirstLastPara="1" wrap="square" lIns="91425" tIns="91425" rIns="91425" bIns="91425" anchor="ctr" anchorCtr="0">
+            <a:noAutofit/>
+          </a:bodyPr>
+          <a:lstStyle/>
+          <a:p>
+            <a:pPr marL="0" lvl="0" indent="0" algn="l" rtl="0">
+              <a:spcBef>
+                <a:spcPts val="0"/>
+              </a:spcBef>
+              <a:spcAft>
+                <a:spcPts val="0"/>
+              </a:spcAft>
+              <a:buNone/>
+            </a:pPr>
+            <a:endParaRPr/>
+          </a:p>
+        </p:txBody>
+      </p:sp>
+      <p:sp>
+        <p:nvSpPr>
+          <p:cNvPr id="132" name="Google Shape;132;p20"/>
+          <p:cNvSpPr txBox="1">
+            <a:spLocks noGrp="1"/>
+          </p:cNvSpPr>
+          <p:nvPr>
+            <p:ph type="title"/>
+          </p:nvPr>
+        </p:nvSpPr>
+        <p:spPr>
+          <a:xfrm>
+            <a:off x="1049550" y="163075"/>
+            <a:ext cx="7599900" cy="572700"/>
+          </a:xfrm>
+          <a:prstGeom prst="rect">
+            <a:avLst/>
+          </a:prstGeom>
+        </p:spPr>
+        <p:txBody>
+          <a:bodyPr spcFirstLastPara="1" wrap="square" lIns="91425" tIns="91425" rIns="91425" bIns="91425" anchor="t" anchorCtr="0">
+            <a:noAutofit/>
+          </a:bodyPr>
+          <a:lstStyle/>
+          <a:p>
+            <a:pPr marL="0" lvl="0" indent="0" algn="l" rtl="0">
+              <a:spcBef>
+                <a:spcPts val="0"/>
+              </a:spcBef>
+              <a:spcAft>
+                <a:spcPts val="0"/>
+              </a:spcAft>
+              <a:buNone/>
+            </a:pPr>
+            <a:r>
+              <a:rPr lang="en-GB" dirty="0">
+                <a:solidFill>
+                  <a:srgbClr val="005A7C"/>
+                </a:solidFill>
+              </a:rPr>
+              <a:t>PROTOTYPE</a:t>
+            </a:r>
+            <a:endParaRPr dirty="0">
+              <a:solidFill>
+                <a:srgbClr val="005A7C"/>
+              </a:solidFill>
+            </a:endParaRPr>
+          </a:p>
+        </p:txBody>
+      </p:sp>
+      <p:pic>
+        <p:nvPicPr>
+          <p:cNvPr id="2050" name="Picture 2"/>
+          <p:cNvPicPr>
+            <a:picLocks noChangeAspect="1" noChangeArrowheads="1"/>
+          </p:cNvPicPr>
+          <p:nvPr/>
+        </p:nvPicPr>
+        <p:blipFill>
+          <a:blip r:embed="rId5">
+            <a:extLst>
+              <a:ext uri="{28A0092B-C50C-407E-A947-70E740481C1C}">
+                <a14:useLocalDpi xmlns:a14="http://schemas.microsoft.com/office/drawing/2010/main" val="0"/>
+              </a:ext>
+            </a:extLst>
+          </a:blip>
+          <a:stretch>
+            <a:fillRect/>
+          </a:stretch>
+        </p:blipFill>
+        <p:spPr bwMode="auto">
+          <a:xfrm>
+            <a:off x="2905776" y="1423918"/>
+            <a:ext cx="3376129" cy="3314118"/>
+          </a:xfrm>
+          <a:prstGeom prst="rect">
+            <a:avLst/>
+          </a:prstGeom>
+          <a:noFill/>
+          <a:extLst>
+            <a:ext uri="{909E8E84-426E-40DD-AFC4-6F175D3DCCD1}">
+              <a14:hiddenFill xmlns:a14="http://schemas.microsoft.com/office/drawing/2010/main">
+                <a:solidFill>
+                  <a:srgbClr val="FFFFFF"/>
+                </a:solidFill>
+              </a14:hiddenFill>
+            </a:ext>
+          </a:extLst>
+        </p:spPr>
+      </p:pic>
+    </p:spTree>
+    <p:extLst>
+      <p:ext uri="{BB962C8B-B14F-4D97-AF65-F5344CB8AC3E}">
+        <p14:creationId xmlns:p14="http://schemas.microsoft.com/office/powerpoint/2010/main" val="680461997"/>
+      </p:ext>
+    </p:extLst>
+  </p:cSld>
+  <p:clrMapOvr>
+    <a:masterClrMapping/>
+  </p:clrMapOvr>
+  <p:timing>
+    <p:tnLst>
+      <p:par>
+        <p:cTn id="1" dur="indefinite" restart="never" nodeType="tmRoot"/>
+      </p:par>
+    </p:tnLst>
+  </p:timing>
+</p:sld>
+</file>
+
+<file path=ppt/slides/slide14.xml><?xml version="1.0" encoding="utf-8"?>
 <p:sld xmlns:a="http://schemas.openxmlformats.org/drawingml/2006/main" xmlns:r="http://schemas.openxmlformats.org/officeDocument/2006/relationships" xmlns:p="http://schemas.openxmlformats.org/presentationml/2006/main">
   <p:cSld>
     <p:bg>
@@ -8124,7 +8992,228 @@
 </p:sld>
 </file>
 
-<file path=ppt/slides/slide13.xml><?xml version="1.0" encoding="utf-8"?>
+<file path=ppt/slides/slide15.xml><?xml version="1.0" encoding="utf-8"?>
+<p:sld xmlns:a="http://schemas.openxmlformats.org/drawingml/2006/main" xmlns:r="http://schemas.openxmlformats.org/officeDocument/2006/relationships" xmlns:p="http://schemas.openxmlformats.org/presentationml/2006/main">
+  <p:cSld>
+    <p:bg>
+      <p:bgPr>
+        <a:solidFill>
+          <a:srgbClr val="FFFFFF"/>
+        </a:solidFill>
+        <a:effectLst/>
+      </p:bgPr>
+    </p:bg>
+    <p:spTree>
+      <p:nvGrpSpPr>
+        <p:cNvPr id="1" name="Shape 127"/>
+        <p:cNvGrpSpPr/>
+        <p:nvPr/>
+      </p:nvGrpSpPr>
+      <p:grpSpPr>
+        <a:xfrm>
+          <a:off x="0" y="0"/>
+          <a:ext cx="0" cy="0"/>
+          <a:chOff x="0" y="0"/>
+          <a:chExt cx="0" cy="0"/>
+        </a:xfrm>
+      </p:grpSpPr>
+      <p:pic>
+        <p:nvPicPr>
+          <p:cNvPr id="129" name="Google Shape;129;p20"/>
+          <p:cNvPicPr preferRelativeResize="0"/>
+          <p:nvPr/>
+        </p:nvPicPr>
+        <p:blipFill>
+          <a:blip r:embed="rId3">
+            <a:alphaModFix/>
+          </a:blip>
+          <a:stretch>
+            <a:fillRect/>
+          </a:stretch>
+        </p:blipFill>
+        <p:spPr>
+          <a:xfrm>
+            <a:off x="56017" y="46250"/>
+            <a:ext cx="2796750" cy="799075"/>
+          </a:xfrm>
+          <a:prstGeom prst="rect">
+            <a:avLst/>
+          </a:prstGeom>
+          <a:noFill/>
+          <a:ln>
+            <a:noFill/>
+          </a:ln>
+        </p:spPr>
+      </p:pic>
+      <p:pic>
+        <p:nvPicPr>
+          <p:cNvPr id="130" name="Google Shape;130;p20"/>
+          <p:cNvPicPr preferRelativeResize="0"/>
+          <p:nvPr/>
+        </p:nvPicPr>
+        <p:blipFill>
+          <a:blip r:embed="rId4">
+            <a:alphaModFix/>
+          </a:blip>
+          <a:stretch>
+            <a:fillRect/>
+          </a:stretch>
+        </p:blipFill>
+        <p:spPr>
+          <a:xfrm>
+            <a:off x="-7164" y="20196"/>
+            <a:ext cx="3166375" cy="845625"/>
+          </a:xfrm>
+          <a:prstGeom prst="rect">
+            <a:avLst/>
+          </a:prstGeom>
+          <a:noFill/>
+          <a:ln>
+            <a:noFill/>
+          </a:ln>
+        </p:spPr>
+      </p:pic>
+      <p:sp>
+        <p:nvSpPr>
+          <p:cNvPr id="131" name="Google Shape;131;p20"/>
+          <p:cNvSpPr/>
+          <p:nvPr/>
+        </p:nvSpPr>
+        <p:spPr>
+          <a:xfrm>
+            <a:off x="974250" y="53425"/>
+            <a:ext cx="7858200" cy="792000"/>
+          </a:xfrm>
+          <a:prstGeom prst="rect">
+            <a:avLst/>
+          </a:prstGeom>
+          <a:solidFill>
+            <a:srgbClr val="F3F3F3"/>
+          </a:solidFill>
+          <a:ln>
+            <a:noFill/>
+          </a:ln>
+        </p:spPr>
+        <p:txBody>
+          <a:bodyPr spcFirstLastPara="1" wrap="square" lIns="91425" tIns="91425" rIns="91425" bIns="91425" anchor="ctr" anchorCtr="0">
+            <a:noAutofit/>
+          </a:bodyPr>
+          <a:lstStyle/>
+          <a:p>
+            <a:pPr marL="0" lvl="0" indent="0" algn="l" rtl="0">
+              <a:spcBef>
+                <a:spcPts val="0"/>
+              </a:spcBef>
+              <a:spcAft>
+                <a:spcPts val="0"/>
+              </a:spcAft>
+              <a:buNone/>
+            </a:pPr>
+            <a:endParaRPr/>
+          </a:p>
+        </p:txBody>
+      </p:sp>
+      <p:sp>
+        <p:nvSpPr>
+          <p:cNvPr id="132" name="Google Shape;132;p20"/>
+          <p:cNvSpPr txBox="1">
+            <a:spLocks noGrp="1"/>
+          </p:cNvSpPr>
+          <p:nvPr>
+            <p:ph type="title"/>
+          </p:nvPr>
+        </p:nvSpPr>
+        <p:spPr>
+          <a:xfrm>
+            <a:off x="1049550" y="163075"/>
+            <a:ext cx="7599900" cy="572700"/>
+          </a:xfrm>
+          <a:prstGeom prst="rect">
+            <a:avLst/>
+          </a:prstGeom>
+        </p:spPr>
+        <p:txBody>
+          <a:bodyPr spcFirstLastPara="1" wrap="square" lIns="91425" tIns="91425" rIns="91425" bIns="91425" anchor="t" anchorCtr="0">
+            <a:noAutofit/>
+          </a:bodyPr>
+          <a:lstStyle/>
+          <a:p>
+            <a:pPr marL="0" lvl="0" indent="0" algn="l" rtl="0">
+              <a:spcBef>
+                <a:spcPts val="0"/>
+              </a:spcBef>
+              <a:spcAft>
+                <a:spcPts val="0"/>
+              </a:spcAft>
+              <a:buNone/>
+            </a:pPr>
+            <a:r>
+              <a:rPr lang="en-GB" dirty="0" smtClean="0">
+                <a:solidFill>
+                  <a:srgbClr val="005A7C"/>
+                </a:solidFill>
+              </a:rPr>
+              <a:t>PROJECT OUTPUT</a:t>
+            </a:r>
+            <a:endParaRPr dirty="0">
+              <a:solidFill>
+                <a:srgbClr val="005A7C"/>
+              </a:solidFill>
+            </a:endParaRPr>
+          </a:p>
+        </p:txBody>
+      </p:sp>
+      <p:pic>
+        <p:nvPicPr>
+          <p:cNvPr id="5" name="그림 4"/>
+          <p:cNvPicPr>
+            <a:picLocks noChangeAspect="1"/>
+          </p:cNvPicPr>
+          <p:nvPr/>
+        </p:nvPicPr>
+        <p:blipFill>
+          <a:blip r:embed="rId5">
+            <a:extLst>
+              <a:ext uri="{28A0092B-C50C-407E-A947-70E740481C1C}">
+                <a14:useLocalDpi xmlns:a14="http://schemas.microsoft.com/office/drawing/2010/main" val="0"/>
+              </a:ext>
+            </a:extLst>
+          </a:blip>
+          <a:stretch>
+            <a:fillRect/>
+          </a:stretch>
+        </p:blipFill>
+        <p:spPr>
+          <a:xfrm>
+            <a:off x="2081605" y="1874072"/>
+            <a:ext cx="4572000" cy="2019300"/>
+          </a:xfrm>
+          <a:prstGeom prst="rect">
+            <a:avLst/>
+          </a:prstGeom>
+        </p:spPr>
+      </p:pic>
+    </p:spTree>
+    <p:extLst>
+      <p:ext uri="{BB962C8B-B14F-4D97-AF65-F5344CB8AC3E}">
+        <p14:creationId xmlns:p14="http://schemas.microsoft.com/office/powerpoint/2010/main" val="1433939621"/>
+      </p:ext>
+    </p:extLst>
+  </p:cSld>
+  <p:clrMapOvr>
+    <a:masterClrMapping/>
+  </p:clrMapOvr>
+  <p:timing>
+    <p:tnLst>
+      <p:par>
+        <p:cTn id="1" dur="indefinite" restart="never" nodeType="tmRoot"/>
+      </p:par>
+    </p:tnLst>
+  </p:timing>
+</p:sld>
+</file>
+
+<file path=ppt/slides/slide16.xml><?xml version="1.0" encoding="utf-8"?>
 <p:sld xmlns:a="http://schemas.openxmlformats.org/drawingml/2006/main" xmlns:r="http://schemas.openxmlformats.org/officeDocument/2006/relationships" xmlns:p="http://schemas.openxmlformats.org/presentationml/2006/main">
   <p:cSld>
     <p:bg>
@@ -8539,7 +9628,11 @@
             </a:pPr>
             <a:r>
               <a:rPr lang="en-CA" dirty="0"/>
-              <a:t>Target Audience</a:t>
+              <a:t>Target </a:t>
+            </a:r>
+            <a:r>
+              <a:rPr lang="en-CA" dirty="0" smtClean="0"/>
+              <a:t>Audience</a:t>
             </a:r>
           </a:p>
           <a:p>
@@ -8554,9 +9647,35 @@
               <a:buChar char="❏"/>
             </a:pPr>
             <a:r>
+              <a:rPr lang="en-CA" dirty="0" smtClean="0"/>
+              <a:t>Prototype</a:t>
+            </a:r>
+            <a:endParaRPr lang="en-CA" dirty="0"/>
+          </a:p>
+          <a:p>
+            <a:pPr marL="457200" lvl="0" indent="-342900" algn="l" rtl="0">
+              <a:spcBef>
+                <a:spcPts val="0"/>
+              </a:spcBef>
+              <a:spcAft>
+                <a:spcPts val="0"/>
+              </a:spcAft>
+              <a:buSzPts val="1800"/>
+              <a:buChar char="❏"/>
+            </a:pPr>
+            <a:r>
+              <a:rPr lang="en-CA" dirty="0" smtClean="0"/>
+              <a:t>Project </a:t>
+            </a:r>
+            <a:r>
               <a:rPr lang="en-CA" dirty="0"/>
-              <a:t>Prototype</a:t>
-            </a:r>
+              <a:t>O</a:t>
+            </a:r>
+            <a:r>
+              <a:rPr lang="en-CA" dirty="0" smtClean="0"/>
+              <a:t>utput</a:t>
+            </a:r>
+            <a:endParaRPr lang="en-CA" dirty="0"/>
           </a:p>
           <a:p>
             <a:pPr marL="457200" lvl="0" indent="-342900" algn="l" rtl="0">
@@ -8895,7 +10014,15 @@
             </a:pPr>
             <a:r>
               <a:rPr lang="en-US" dirty="0" smtClean="0"/>
-              <a:t>Favorite things: Drawing and playing Real-time strategy games</a:t>
+              <a:t>Favorite things: </a:t>
+            </a:r>
+            <a:r>
+              <a:rPr lang="en-US" dirty="0" smtClean="0"/>
+              <a:t>Drawing, </a:t>
+            </a:r>
+            <a:r>
+              <a:rPr lang="en-US" dirty="0" smtClean="0"/>
+              <a:t>and playing Real-time strategy games</a:t>
             </a:r>
           </a:p>
           <a:p>
@@ -8924,49 +10051,12 @@
             </a:pPr>
             <a:r>
               <a:rPr lang="en-US" dirty="0" smtClean="0"/>
-              <a:t>C++, C#, and Python</a:t>
-            </a:r>
-          </a:p>
-          <a:p>
-            <a:pPr marL="457200" lvl="0" indent="-342900" algn="l" rtl="0">
-              <a:spcBef>
-                <a:spcPts val="0"/>
-              </a:spcBef>
-              <a:spcAft>
-                <a:spcPts val="0"/>
-              </a:spcAft>
-              <a:buSzPts val="1800"/>
-              <a:buChar char="❏"/>
-            </a:pPr>
-            <a:endParaRPr lang="en-US" dirty="0"/>
-          </a:p>
-          <a:p>
-            <a:pPr marL="457200" lvl="0" indent="-342900" algn="l" rtl="0">
-              <a:spcBef>
-                <a:spcPts val="0"/>
-              </a:spcBef>
-              <a:spcAft>
-                <a:spcPts val="0"/>
-              </a:spcAft>
-              <a:buSzPts val="1800"/>
-              <a:buChar char="❏"/>
-            </a:pPr>
+              <a:t>C++, C#, and </a:t>
+            </a:r>
             <a:r>
               <a:rPr lang="en-US" dirty="0" smtClean="0"/>
-              <a:t>My life in Canada for 3 years = The biggest adventure</a:t>
-            </a:r>
-          </a:p>
-          <a:p>
-            <a:pPr marL="457200" lvl="0" indent="-342900" algn="l" rtl="0">
-              <a:spcBef>
-                <a:spcPts val="0"/>
-              </a:spcBef>
-              <a:spcAft>
-                <a:spcPts val="0"/>
-              </a:spcAft>
-              <a:buSzPts val="1800"/>
-              <a:buChar char="❏"/>
-            </a:pPr>
+              <a:t>Python</a:t>
+            </a:r>
             <a:endParaRPr lang="en-US" dirty="0" smtClean="0"/>
           </a:p>
         </p:txBody>
@@ -9258,11 +10348,7 @@
             </a:pPr>
             <a:r>
               <a:rPr lang="en-US" dirty="0" smtClean="0"/>
-              <a:t>Direction: </a:t>
-            </a:r>
-            <a:r>
-              <a:rPr lang="en-US" dirty="0" smtClean="0"/>
-              <a:t>Implementation the combination of pathfinding and state machine with multi-threading techniques.</a:t>
+              <a:t>Direction: Implementation the combination of pathfinding and state machine with multi-threading techniques.</a:t>
             </a:r>
             <a:endParaRPr dirty="0"/>
           </a:p>
@@ -9512,8 +10598,9 @@
             </a:r>
             <a:r>
               <a:rPr lang="en-CA" dirty="0" smtClean="0"/>
-              <a:t>multithreading</a:t>
-            </a:r>
+              <a:t>multithreading – Senior research</a:t>
+            </a:r>
+            <a:endParaRPr lang="en-CA" dirty="0" smtClean="0"/>
           </a:p>
           <a:p>
             <a:pPr lvl="1">
@@ -9530,28 +10617,21 @@
             </a:pPr>
             <a:r>
               <a:rPr lang="en-CA" dirty="0" smtClean="0"/>
-              <a:t>Questions for thread work</a:t>
+              <a:t>Curiosity</a:t>
+            </a:r>
+            <a:r>
+              <a:rPr lang="en-CA" dirty="0" smtClean="0"/>
+              <a:t> </a:t>
+            </a:r>
+            <a:r>
+              <a:rPr lang="en-CA" dirty="0" smtClean="0"/>
+              <a:t>for thread work</a:t>
             </a:r>
             <a:endParaRPr lang="en-CA" dirty="0"/>
           </a:p>
           <a:p>
-            <a:pPr lvl="0">
-              <a:buChar char="❏"/>
-            </a:pPr>
-            <a:endParaRPr lang="en-CA" dirty="0"/>
-          </a:p>
-          <a:p>
-            <a:pPr lvl="0">
-              <a:buChar char="❏"/>
-            </a:pPr>
-            <a:r>
-              <a:rPr lang="en-CA" dirty="0" smtClean="0"/>
-              <a:t>Senior research – Analyze about Multithreading</a:t>
-            </a:r>
-          </a:p>
-          <a:p>
-            <a:pPr lvl="0">
-              <a:buChar char="❏"/>
+            <a:pPr marL="114300" lvl="0" indent="0">
+              <a:buNone/>
             </a:pPr>
             <a:endParaRPr lang="en-CA" dirty="0" smtClean="0"/>
           </a:p>
@@ -9561,13 +10641,13 @@
             </a:pPr>
             <a:r>
               <a:rPr lang="en-US" dirty="0" smtClean="0"/>
-              <a:t>Main motivation: Commandos </a:t>
-            </a:r>
-            <a:r>
-              <a:rPr lang="en-US" dirty="0" smtClean="0"/>
-              <a:t>1</a:t>
-            </a:r>
-            <a:endParaRPr dirty="0"/>
+              <a:t>Main motivation: </a:t>
+            </a:r>
+            <a:r>
+              <a:rPr lang="en-US" b="1" dirty="0" smtClean="0"/>
+              <a:t>Commandos 1</a:t>
+            </a:r>
+            <a:endParaRPr b="1" dirty="0"/>
           </a:p>
         </p:txBody>
       </p:sp>
@@ -9739,7 +10819,7 @@
         </p:blipFill>
         <p:spPr>
           <a:xfrm>
-            <a:off x="5486399" y="449425"/>
+            <a:off x="5174427" y="2826865"/>
             <a:ext cx="3506993" cy="1972684"/>
           </a:xfrm>
           <a:prstGeom prst="rect">
@@ -9966,14 +11046,14 @@
                 <a:gridCol w="3707561">
                   <a:extLst>
                     <a:ext uri="{9D8B030D-6E8A-4147-A177-3AD203B41FA5}">
-                      <a16:colId xmlns:a16="http://schemas.microsoft.com/office/drawing/2014/main" xmlns="" val="286823836"/>
+                      <a16:colId xmlns="" xmlns:a16="http://schemas.microsoft.com/office/drawing/2014/main" val="286823836"/>
                     </a:ext>
                   </a:extLst>
                 </a:gridCol>
                 <a:gridCol w="3707561">
                   <a:extLst>
                     <a:ext uri="{9D8B030D-6E8A-4147-A177-3AD203B41FA5}">
-                      <a16:colId xmlns:a16="http://schemas.microsoft.com/office/drawing/2014/main" xmlns="" val="2898565558"/>
+                      <a16:colId xmlns="" xmlns:a16="http://schemas.microsoft.com/office/drawing/2014/main" val="2898565558"/>
                     </a:ext>
                   </a:extLst>
                 </a:gridCol>
@@ -10004,7 +11084,7 @@
                 </a:tc>
                 <a:extLst>
                   <a:ext uri="{0D108BD9-81ED-4DB2-BD59-A6C34878D82A}">
-                    <a16:rowId xmlns:a16="http://schemas.microsoft.com/office/drawing/2014/main" xmlns="" val="2222532343"/>
+                    <a16:rowId xmlns="" xmlns:a16="http://schemas.microsoft.com/office/drawing/2014/main" val="2222532343"/>
                   </a:ext>
                 </a:extLst>
               </a:tr>
@@ -10038,7 +11118,7 @@
                 </a:tc>
                 <a:extLst>
                   <a:ext uri="{0D108BD9-81ED-4DB2-BD59-A6C34878D82A}">
-                    <a16:rowId xmlns:a16="http://schemas.microsoft.com/office/drawing/2014/main" xmlns="" val="2031816787"/>
+                    <a16:rowId xmlns="" xmlns:a16="http://schemas.microsoft.com/office/drawing/2014/main" val="2031816787"/>
                   </a:ext>
                 </a:extLst>
               </a:tr>
@@ -10072,7 +11152,7 @@
                 </a:tc>
                 <a:extLst>
                   <a:ext uri="{0D108BD9-81ED-4DB2-BD59-A6C34878D82A}">
-                    <a16:rowId xmlns:a16="http://schemas.microsoft.com/office/drawing/2014/main" xmlns="" val="3386888986"/>
+                    <a16:rowId xmlns="" xmlns:a16="http://schemas.microsoft.com/office/drawing/2014/main" val="3386888986"/>
                   </a:ext>
                 </a:extLst>
               </a:tr>
@@ -10106,7 +11186,7 @@
                 </a:tc>
                 <a:extLst>
                   <a:ext uri="{0D108BD9-81ED-4DB2-BD59-A6C34878D82A}">
-                    <a16:rowId xmlns:a16="http://schemas.microsoft.com/office/drawing/2014/main" xmlns="" val="3897717921"/>
+                    <a16:rowId xmlns="" xmlns:a16="http://schemas.microsoft.com/office/drawing/2014/main" val="3897717921"/>
                   </a:ext>
                 </a:extLst>
               </a:tr>
@@ -10144,7 +11224,7 @@
                 </a:tc>
                 <a:extLst>
                   <a:ext uri="{0D108BD9-81ED-4DB2-BD59-A6C34878D82A}">
-                    <a16:rowId xmlns:a16="http://schemas.microsoft.com/office/drawing/2014/main" xmlns="" val="2683065940"/>
+                    <a16:rowId xmlns="" xmlns:a16="http://schemas.microsoft.com/office/drawing/2014/main" val="2683065940"/>
                   </a:ext>
                 </a:extLst>
               </a:tr>
@@ -10772,7 +11852,15 @@
             </a:r>
             <a:r>
               <a:rPr lang="en-GB" dirty="0" smtClean="0"/>
-              <a:t> to print in a specific time</a:t>
+              <a:t> to print in </a:t>
+            </a:r>
+            <a:r>
+              <a:rPr lang="en-GB" dirty="0" smtClean="0"/>
+              <a:t>every </a:t>
+            </a:r>
+            <a:r>
+              <a:rPr lang="en-GB" dirty="0" smtClean="0"/>
+              <a:t>specific time</a:t>
             </a:r>
           </a:p>
         </p:txBody>
@@ -11108,8 +12196,13 @@
             </a:r>
             <a:r>
               <a:rPr lang="en-US" dirty="0"/>
-              <a:t> - Wall and Bush</a:t>
-            </a:r>
+              <a:t> - Wall and </a:t>
+            </a:r>
+            <a:r>
+              <a:rPr lang="en-US" dirty="0" smtClean="0"/>
+              <a:t>Bush</a:t>
+            </a:r>
+            <a:endParaRPr lang="en-US" dirty="0"/>
           </a:p>
           <a:p>
             <a:pPr lvl="1" indent="-342900">
@@ -11144,7 +12237,35 @@
             </a:pPr>
             <a:r>
               <a:rPr lang="en-CA" dirty="0" smtClean="0"/>
-              <a:t>Receive the order from an entity, then allocate an order resource into the queue list, which is locked. Afterwards one or many thread will </a:t>
+              <a:t>Receive </a:t>
+            </a:r>
+            <a:r>
+              <a:rPr lang="en-CA" dirty="0" smtClean="0"/>
+              <a:t>a request</a:t>
+            </a:r>
+            <a:r>
+              <a:rPr lang="en-CA" dirty="0" smtClean="0"/>
+              <a:t> </a:t>
+            </a:r>
+            <a:r>
+              <a:rPr lang="en-CA" dirty="0" smtClean="0"/>
+              <a:t>from an entity, then </a:t>
+            </a:r>
+            <a:r>
+              <a:rPr lang="en-CA" dirty="0" smtClean="0"/>
+              <a:t>allocate and lock </a:t>
+            </a:r>
+            <a:r>
+              <a:rPr lang="en-CA" dirty="0" smtClean="0"/>
+              <a:t>an order </a:t>
+            </a:r>
+            <a:r>
+              <a:rPr lang="en-CA" dirty="0" smtClean="0"/>
+              <a:t>resource into the queue list. </a:t>
+            </a:r>
+            <a:r>
+              <a:rPr lang="en-CA" dirty="0" smtClean="0"/>
+              <a:t>Afterwards one or many thread will </a:t>
             </a:r>
             <a:r>
               <a:rPr lang="en-CA" dirty="0"/>
@@ -11175,7 +12296,11 @@
             </a:pPr>
             <a:r>
               <a:rPr lang="en-CA" dirty="0" smtClean="0"/>
-              <a:t>Thread pool technique</a:t>
+              <a:t>Thread pool </a:t>
+            </a:r>
+            <a:r>
+              <a:rPr lang="en-CA" dirty="0" smtClean="0"/>
+              <a:t>technique</a:t>
             </a:r>
           </a:p>
           <a:p>
@@ -11219,11 +12344,7 @@
             </a:r>
             <a:r>
               <a:rPr lang="en-CA" dirty="0" smtClean="0"/>
-              <a:t>one or </a:t>
-            </a:r>
-            <a:r>
-              <a:rPr lang="en-CA" smtClean="0"/>
-              <a:t>many task </a:t>
+              <a:t>one or many task </a:t>
             </a:r>
             <a:r>
               <a:rPr lang="en-CA" dirty="0"/>
@@ -11231,11 +12352,7 @@
             </a:r>
             <a:r>
               <a:rPr lang="en-CA" dirty="0" smtClean="0"/>
-              <a:t>synchronously. </a:t>
-            </a:r>
-            <a:r>
-              <a:rPr lang="en-CA" dirty="0" smtClean="0"/>
-              <a:t>(Keywords: </a:t>
+              <a:t>synchronously. (Keywords: </a:t>
             </a:r>
             <a:r>
               <a:rPr lang="en-CA" dirty="0" err="1" smtClean="0"/>

</xml_diff>